<commit_message>
Added Waracle contract context
</commit_message>
<xml_diff>
--- a/Cost_Benefit_Analysis_Template.pptx
+++ b/Cost_Benefit_Analysis_Template.pptx
@@ -3437,7 +3437,7 @@
               </a:defRPr>
             </a:pPr>
             <a:r>
-              <a:t>Comparison of in-house development costs versus external supplier quotes for the Affordability Calculator replacement.</a:t>
+              <a:t>Replacing the Waracle Affordability Calculator. Current Waracle support contract (£3,775/month) ends February 2025. In-house go-live targeted for end of February, enabling seamless transition with no renewal required.</a:t>
             </a:r>
           </a:p>
         </p:txBody>
@@ -3618,7 +3618,7 @@
                         </a:defRPr>
                       </a:pPr>
                       <a:r>
-                        <a:t>Annual Support &amp; Hosting</a:t>
+                        <a:t>Annual Support &amp; Hosting (replaces Waracle)</a:t>
                       </a:r>
                     </a:p>
                   </a:txBody>
@@ -3931,7 +3931,7 @@
               </a:defRPr>
             </a:pPr>
             <a:r>
-              <a:t>Ongoing annual saving of £120,000 by avoiding third-party hosting and support costs</a:t>
+              <a:t>Saves £3,775/month (£45,300/year) from Waracle contract not renewed, plus avoids £120,000/year Podium costs</a:t>
             </a:r>
           </a:p>
         </p:txBody>
@@ -5261,7 +5261,7 @@
               </a:defRPr>
             </a:pPr>
             <a:r>
-              <a:t>Costs that would have been incurred if the project had been outsourced to a third-party supplier.</a:t>
+              <a:t>Current Waracle contract: £3,775/month (£45,300/year). Contract ends February 2025. Podium would have replaced Waracle at higher cost.</a:t>
             </a:r>
           </a:p>
         </p:txBody>
@@ -5492,7 +5492,7 @@
                         </a:defRPr>
                       </a:pPr>
                       <a:r>
-                        <a:t>Monthly hosting/support</a:t>
+                        <a:t>Monthly support (replaces Waracle)</a:t>
                       </a:r>
                     </a:p>
                   </a:txBody>
@@ -5561,7 +5561,7 @@
                         </a:defRPr>
                       </a:pPr>
                       <a:r>
-                        <a:t>Ongoing commitment</a:t>
+                        <a:t>vs current £3,775/month</a:t>
                       </a:r>
                     </a:p>
                   </a:txBody>
@@ -5586,7 +5586,7 @@
                         </a:defRPr>
                       </a:pPr>
                       <a:r>
-                        <a:t>Annual hosting/support</a:t>
+                        <a:t>Annual support cost</a:t>
                       </a:r>
                     </a:p>
                   </a:txBody>
@@ -5655,7 +5655,7 @@
                         </a:defRPr>
                       </a:pPr>
                       <a:r>
-                        <a:t>12 months</a:t>
+                        <a:t>vs current £45,300/year</a:t>
                       </a:r>
                     </a:p>
                   </a:txBody>
@@ -6099,7 +6099,7 @@
               </a:defRPr>
             </a:pPr>
             <a:r>
-              <a:t>Projected savings based on realistic external cost estimates. Ongoing savings from avoiding third-party hosting and support.</a:t>
+              <a:t>In-house go-live end of February 2025 enables Waracle contract to end without renewal. Comparison vs Podium alternative (realistic estimates).</a:t>
             </a:r>
           </a:p>
         </p:txBody>
@@ -7108,7 +7108,7 @@
                         </a:defRPr>
                       </a:pPr>
                       <a:r>
-                        <a:t>Ongoing annual saving</a:t>
+                        <a:t>Waracle contract saved (from March)</a:t>
                       </a:r>
                     </a:p>
                   </a:txBody>
@@ -7131,7 +7131,7 @@
                         </a:defRPr>
                       </a:pPr>
                       <a:r>
-                        <a:t>£120,000</a:t>
+                        <a:t>£3,775/month (£45,300/year)</a:t>
                       </a:r>
                     </a:p>
                   </a:txBody>
@@ -7307,7 +7307,7 @@
               </a:defRPr>
             </a:pPr>
             <a:r>
-              <a:t>• No ongoing third-party hosting or support costs</a:t>
+              <a:t>• Waracle contract ends February 2025 - no renewal required</a:t>
             </a:r>
           </a:p>
         </p:txBody>
@@ -7342,7 +7342,7 @@
               </a:defRPr>
             </a:pPr>
             <a:r>
-              <a:t>• No external dependency for future changes or FSMA compliance</a:t>
+              <a:t>• No ongoing third-party hosting or support costs</a:t>
             </a:r>
           </a:p>
         </p:txBody>
@@ -7377,7 +7377,7 @@
               </a:defRPr>
             </a:pPr>
             <a:r>
-              <a:t>• Internal capability and knowledge retention</a:t>
+              <a:t>• No external dependency for future changes or FSMA compliance</a:t>
             </a:r>
           </a:p>
         </p:txBody>
@@ -7412,7 +7412,7 @@
               </a:defRPr>
             </a:pPr>
             <a:r>
-              <a:t>• Faster turnaround for future enhancements</a:t>
+              <a:t>• Internal capability and knowledge retention</a:t>
             </a:r>
           </a:p>
         </p:txBody>
@@ -7447,7 +7447,7 @@
               </a:defRPr>
             </a:pPr>
             <a:r>
-              <a:t>• Full control over codebase and roadmap</a:t>
+              <a:t>• Full control over codebase and future roadmap</a:t>
             </a:r>
           </a:p>
         </p:txBody>

</xml_diff>